<commit_message>
updated presentation + documentation with performance information
</commit_message>
<xml_diff>
--- a/FunctionalDerpendency/FunctionalDerp_pres.pptx
+++ b/FunctionalDerpendency/FunctionalDerp_pres.pptx
@@ -1740,7 +1740,6 @@
               <a:rPr lang="en-US" dirty="0" smtClean="0"/>
               <a:t> implementation</a:t>
             </a:r>
-            <a:endParaRPr lang="en-US" dirty="0" smtClean="0"/>
           </a:p>
           <a:p>
             <a:pPr lvl="1"/>
@@ -1776,7 +1775,6 @@
               <a:rPr lang="en-US" dirty="0" smtClean="0"/>
               <a:t>Search biggest cover of difference sets</a:t>
             </a:r>
-            <a:endParaRPr lang="en-US" dirty="0" smtClean="0"/>
           </a:p>
           <a:p>
             <a:pPr lvl="1"/>
@@ -1814,7 +1812,6 @@
               <a:rPr lang="en-US" dirty="0" smtClean="0"/>
               <a:t> cover search</a:t>
             </a:r>
-            <a:endParaRPr lang="en-US" dirty="0" smtClean="0"/>
           </a:p>
           <a:p>
             <a:endParaRPr lang="en-US" dirty="0" smtClean="0"/>
@@ -1970,20 +1967,24 @@
           <a:p>
             <a:pPr lvl="1"/>
             <a:r>
+              <a:rPr lang="de-DE" dirty="0" smtClean="0"/>
+              <a:t>Ncvoter-1k: </a:t>
+            </a:r>
+            <a:r>
+              <a:rPr lang="de-DE" smtClean="0"/>
+              <a:t>~2500 </a:t>
+            </a:r>
+            <a:r>
+              <a:rPr lang="de-DE" dirty="0" err="1" smtClean="0"/>
+              <a:t>ms</a:t>
+            </a:r>
+            <a:endParaRPr lang="en-US" dirty="0" smtClean="0"/>
+          </a:p>
+          <a:p>
+            <a:pPr lvl="1"/>
+            <a:r>
               <a:rPr lang="en-US" dirty="0" smtClean="0"/>
-              <a:t>still pending..</a:t>
-            </a:r>
-            <a:endParaRPr lang="en-US" dirty="0" smtClean="0"/>
-          </a:p>
-          <a:p>
-            <a:pPr lvl="1"/>
-            <a:r>
-              <a:rPr lang="en-US" dirty="0" smtClean="0"/>
-              <a:t>Bottleneck is </a:t>
-            </a:r>
-            <a:r>
-              <a:rPr lang="en-US" dirty="0" smtClean="0"/>
-              <a:t>most likely difference set creation</a:t>
+              <a:t>Bottleneck is most likely difference set creation</a:t>
             </a:r>
           </a:p>
           <a:p>
@@ -1999,7 +2000,20 @@
               <a:rPr lang="en-US" dirty="0" smtClean="0"/>
               <a:t>Agree sets require equivalence class creation -&gt; created from stripped partitions</a:t>
             </a:r>
-            <a:endParaRPr lang="en-US" dirty="0" smtClean="0"/>
+          </a:p>
+          <a:p>
+            <a:pPr lvl="1"/>
+            <a:r>
+              <a:rPr lang="en-US" dirty="0" smtClean="0"/>
+              <a:t>…causing the memory limit as well:</a:t>
+            </a:r>
+          </a:p>
+          <a:p>
+            <a:pPr lvl="2"/>
+            <a:r>
+              <a:rPr lang="en-US" dirty="0" smtClean="0"/>
+              <a:t>fd_reduced15 is not able to complete…</a:t>
+            </a:r>
           </a:p>
           <a:p>
             <a:endParaRPr lang="en-US" dirty="0" smtClean="0"/>

</xml_diff>